<commit_message>
maj image hero, entrainements et contact
</commit_message>
<xml_diff>
--- a/scratch/visuels.pptx
+++ b/scratch/visuels.pptx
@@ -245,7 +245,7 @@
           <a:p>
             <a:fld id="{C2F21632-6FA8-4582-B772-26B1689FE206}" type="datetimeFigureOut">
               <a:rPr lang="fr-FR" smtClean="0"/>
-              <a:t>22/05/2024</a:t>
+              <a:t>28/05/2024</a:t>
             </a:fld>
             <a:endParaRPr lang="fr-FR"/>
           </a:p>
@@ -415,7 +415,7 @@
           <a:p>
             <a:fld id="{C2F21632-6FA8-4582-B772-26B1689FE206}" type="datetimeFigureOut">
               <a:rPr lang="fr-FR" smtClean="0"/>
-              <a:t>22/05/2024</a:t>
+              <a:t>28/05/2024</a:t>
             </a:fld>
             <a:endParaRPr lang="fr-FR"/>
           </a:p>
@@ -595,7 +595,7 @@
           <a:p>
             <a:fld id="{C2F21632-6FA8-4582-B772-26B1689FE206}" type="datetimeFigureOut">
               <a:rPr lang="fr-FR" smtClean="0"/>
-              <a:t>22/05/2024</a:t>
+              <a:t>28/05/2024</a:t>
             </a:fld>
             <a:endParaRPr lang="fr-FR"/>
           </a:p>
@@ -765,7 +765,7 @@
           <a:p>
             <a:fld id="{C2F21632-6FA8-4582-B772-26B1689FE206}" type="datetimeFigureOut">
               <a:rPr lang="fr-FR" smtClean="0"/>
-              <a:t>22/05/2024</a:t>
+              <a:t>28/05/2024</a:t>
             </a:fld>
             <a:endParaRPr lang="fr-FR"/>
           </a:p>
@@ -1011,7 +1011,7 @@
           <a:p>
             <a:fld id="{C2F21632-6FA8-4582-B772-26B1689FE206}" type="datetimeFigureOut">
               <a:rPr lang="fr-FR" smtClean="0"/>
-              <a:t>22/05/2024</a:t>
+              <a:t>28/05/2024</a:t>
             </a:fld>
             <a:endParaRPr lang="fr-FR"/>
           </a:p>
@@ -1243,7 +1243,7 @@
           <a:p>
             <a:fld id="{C2F21632-6FA8-4582-B772-26B1689FE206}" type="datetimeFigureOut">
               <a:rPr lang="fr-FR" smtClean="0"/>
-              <a:t>22/05/2024</a:t>
+              <a:t>28/05/2024</a:t>
             </a:fld>
             <a:endParaRPr lang="fr-FR"/>
           </a:p>
@@ -1610,7 +1610,7 @@
           <a:p>
             <a:fld id="{C2F21632-6FA8-4582-B772-26B1689FE206}" type="datetimeFigureOut">
               <a:rPr lang="fr-FR" smtClean="0"/>
-              <a:t>22/05/2024</a:t>
+              <a:t>28/05/2024</a:t>
             </a:fld>
             <a:endParaRPr lang="fr-FR"/>
           </a:p>
@@ -1728,7 +1728,7 @@
           <a:p>
             <a:fld id="{C2F21632-6FA8-4582-B772-26B1689FE206}" type="datetimeFigureOut">
               <a:rPr lang="fr-FR" smtClean="0"/>
-              <a:t>22/05/2024</a:t>
+              <a:t>28/05/2024</a:t>
             </a:fld>
             <a:endParaRPr lang="fr-FR"/>
           </a:p>
@@ -1823,7 +1823,7 @@
           <a:p>
             <a:fld id="{C2F21632-6FA8-4582-B772-26B1689FE206}" type="datetimeFigureOut">
               <a:rPr lang="fr-FR" smtClean="0"/>
-              <a:t>22/05/2024</a:t>
+              <a:t>28/05/2024</a:t>
             </a:fld>
             <a:endParaRPr lang="fr-FR"/>
           </a:p>
@@ -2100,7 +2100,7 @@
           <a:p>
             <a:fld id="{C2F21632-6FA8-4582-B772-26B1689FE206}" type="datetimeFigureOut">
               <a:rPr lang="fr-FR" smtClean="0"/>
-              <a:t>22/05/2024</a:t>
+              <a:t>28/05/2024</a:t>
             </a:fld>
             <a:endParaRPr lang="fr-FR"/>
           </a:p>
@@ -2353,7 +2353,7 @@
           <a:p>
             <a:fld id="{C2F21632-6FA8-4582-B772-26B1689FE206}" type="datetimeFigureOut">
               <a:rPr lang="fr-FR" smtClean="0"/>
-              <a:t>22/05/2024</a:t>
+              <a:t>28/05/2024</a:t>
             </a:fld>
             <a:endParaRPr lang="fr-FR"/>
           </a:p>
@@ -2566,7 +2566,7 @@
           <a:p>
             <a:fld id="{C2F21632-6FA8-4582-B772-26B1689FE206}" type="datetimeFigureOut">
               <a:rPr lang="fr-FR" smtClean="0"/>
-              <a:t>22/05/2024</a:t>
+              <a:t>28/05/2024</a:t>
             </a:fld>
             <a:endParaRPr lang="fr-FR"/>
           </a:p>
@@ -2973,6 +2973,41 @@
       </p:grpSpPr>
       <p:pic>
         <p:nvPicPr>
+          <p:cNvPr id="3" name="Image 2"/>
+          <p:cNvPicPr>
+            <a:picLocks noChangeAspect="1"/>
+          </p:cNvPicPr>
+          <p:nvPr/>
+        </p:nvPicPr>
+        <p:blipFill rotWithShape="1">
+          <a:blip r:embed="rId2" cstate="print">
+            <a:extLst>
+              <a:ext uri="{28A0092B-C50C-407E-A947-70E740481C1C}">
+                <a14:useLocalDpi xmlns:a14="http://schemas.microsoft.com/office/drawing/2010/main" val="0"/>
+              </a:ext>
+            </a:extLst>
+          </a:blip>
+          <a:srcRect l="3298" t="14600" r="5541" b="16974"/>
+          <a:stretch/>
+        </p:blipFill>
+        <p:spPr>
+          <a:xfrm>
+            <a:off x="5256770" y="3929964"/>
+            <a:ext cx="4731961" cy="2663867"/>
+          </a:xfrm>
+          <a:prstGeom prst="rect">
+            <a:avLst/>
+          </a:prstGeom>
+          <a:ln>
+            <a:noFill/>
+          </a:ln>
+          <a:effectLst>
+            <a:softEdge rad="112500"/>
+          </a:effectLst>
+        </p:spPr>
+      </p:pic>
+      <p:pic>
+        <p:nvPicPr>
           <p:cNvPr id="4" name="Image 3"/>
           <p:cNvPicPr>
             <a:picLocks noChangeAspect="1"/>
@@ -2980,7 +3015,7 @@
           <p:nvPr/>
         </p:nvPicPr>
         <p:blipFill>
-          <a:blip r:embed="rId2"/>
+          <a:blip r:embed="rId3"/>
           <a:stretch>
             <a:fillRect/>
           </a:stretch>
@@ -3036,7 +3071,7 @@
           <p:nvPr/>
         </p:nvPicPr>
         <p:blipFill>
-          <a:blip r:embed="rId3"/>
+          <a:blip r:embed="rId4"/>
           <a:stretch>
             <a:fillRect/>
           </a:stretch>
@@ -3077,56 +3112,6 @@
             <a:bevelT w="25400" h="19050"/>
             <a:contourClr>
               <a:srgbClr val="FFFFFF"/>
-            </a:contourClr>
-          </a:sp3d>
-        </p:spPr>
-      </p:pic>
-      <p:pic>
-        <p:nvPicPr>
-          <p:cNvPr id="7" name="Image 6"/>
-          <p:cNvPicPr>
-            <a:picLocks noChangeAspect="1"/>
-          </p:cNvPicPr>
-          <p:nvPr/>
-        </p:nvPicPr>
-        <p:blipFill>
-          <a:blip r:embed="rId4"/>
-          <a:stretch>
-            <a:fillRect/>
-          </a:stretch>
-        </p:blipFill>
-        <p:spPr>
-          <a:xfrm>
-            <a:off x="5320936" y="3796932"/>
-            <a:ext cx="4097791" cy="2518691"/>
-          </a:xfrm>
-          <a:prstGeom prst="roundRect">
-            <a:avLst>
-              <a:gd name="adj" fmla="val 4167"/>
-            </a:avLst>
-          </a:prstGeom>
-          <a:solidFill>
-            <a:srgbClr val="FFFFFF"/>
-          </a:solidFill>
-          <a:ln w="76200" cap="sq">
-            <a:solidFill>
-              <a:srgbClr val="EAEAEA"/>
-            </a:solidFill>
-            <a:miter lim="800000"/>
-          </a:ln>
-          <a:effectLst>
-            <a:reflection blurRad="12700" stA="33000" endPos="28000" dist="5000" dir="5400000" sy="-100000" algn="bl" rotWithShape="0"/>
-          </a:effectLst>
-          <a:scene3d>
-            <a:camera prst="orthographicFront"/>
-            <a:lightRig rig="threePt" dir="t">
-              <a:rot lat="0" lon="0" rev="2700000"/>
-            </a:lightRig>
-          </a:scene3d>
-          <a:sp3d contourW="6350">
-            <a:bevelT h="38100"/>
-            <a:contourClr>
-              <a:srgbClr val="C0C0C0"/>
             </a:contourClr>
           </a:sp3d>
         </p:spPr>

</xml_diff>